<commit_message>
Add classes for Neo4j management
</commit_message>
<xml_diff>
--- a/Documentation/slides.pptx
+++ b/Documentation/slides.pptx
@@ -268,7 +268,7 @@
           <a:p>
             <a:fld id="{0EF95162-6873-F647-B392-BF6A1F606277}" type="datetimeFigureOut">
               <a:rPr lang="it-IT" smtClean="0"/>
-              <a:t>03/12/20</a:t>
+              <a:t>04/12/20</a:t>
             </a:fld>
             <a:endParaRPr lang="it-IT"/>
           </a:p>
@@ -806,7 +806,7 @@
           <a:p>
             <a:fld id="{2FDCBEE4-315A-8E42-835E-29A1DAE07625}" type="datetimeFigureOut">
               <a:rPr lang="it-IT" smtClean="0"/>
-              <a:t>03/12/20</a:t>
+              <a:t>04/12/20</a:t>
             </a:fld>
             <a:endParaRPr lang="it-IT"/>
           </a:p>
@@ -998,7 +998,7 @@
           <a:p>
             <a:fld id="{2FDCBEE4-315A-8E42-835E-29A1DAE07625}" type="datetimeFigureOut">
               <a:rPr lang="it-IT" smtClean="0"/>
-              <a:t>03/12/20</a:t>
+              <a:t>04/12/20</a:t>
             </a:fld>
             <a:endParaRPr lang="it-IT"/>
           </a:p>
@@ -1200,7 +1200,7 @@
           <a:p>
             <a:fld id="{2FDCBEE4-315A-8E42-835E-29A1DAE07625}" type="datetimeFigureOut">
               <a:rPr lang="it-IT" smtClean="0"/>
-              <a:t>03/12/20</a:t>
+              <a:t>04/12/20</a:t>
             </a:fld>
             <a:endParaRPr lang="it-IT"/>
           </a:p>
@@ -1392,7 +1392,7 @@
           <a:p>
             <a:fld id="{2FDCBEE4-315A-8E42-835E-29A1DAE07625}" type="datetimeFigureOut">
               <a:rPr lang="it-IT" smtClean="0"/>
-              <a:t>03/12/20</a:t>
+              <a:t>04/12/20</a:t>
             </a:fld>
             <a:endParaRPr lang="it-IT"/>
           </a:p>
@@ -1661,7 +1661,7 @@
           <a:p>
             <a:fld id="{2FDCBEE4-315A-8E42-835E-29A1DAE07625}" type="datetimeFigureOut">
               <a:rPr lang="it-IT" smtClean="0"/>
-              <a:t>03/12/20</a:t>
+              <a:t>04/12/20</a:t>
             </a:fld>
             <a:endParaRPr lang="it-IT"/>
           </a:p>
@@ -1970,7 +1970,7 @@
           <a:p>
             <a:fld id="{2FDCBEE4-315A-8E42-835E-29A1DAE07625}" type="datetimeFigureOut">
               <a:rPr lang="it-IT" smtClean="0"/>
-              <a:t>03/12/20</a:t>
+              <a:t>04/12/20</a:t>
             </a:fld>
             <a:endParaRPr lang="it-IT"/>
           </a:p>
@@ -2413,7 +2413,7 @@
           <a:p>
             <a:fld id="{2FDCBEE4-315A-8E42-835E-29A1DAE07625}" type="datetimeFigureOut">
               <a:rPr lang="it-IT" smtClean="0"/>
-              <a:t>03/12/20</a:t>
+              <a:t>04/12/20</a:t>
             </a:fld>
             <a:endParaRPr lang="it-IT"/>
           </a:p>
@@ -2554,7 +2554,7 @@
           <a:p>
             <a:fld id="{2FDCBEE4-315A-8E42-835E-29A1DAE07625}" type="datetimeFigureOut">
               <a:rPr lang="it-IT" smtClean="0"/>
-              <a:t>03/12/20</a:t>
+              <a:t>04/12/20</a:t>
             </a:fld>
             <a:endParaRPr lang="it-IT"/>
           </a:p>
@@ -2673,7 +2673,7 @@
           <a:p>
             <a:fld id="{2FDCBEE4-315A-8E42-835E-29A1DAE07625}" type="datetimeFigureOut">
               <a:rPr lang="it-IT" smtClean="0"/>
-              <a:t>03/12/20</a:t>
+              <a:t>04/12/20</a:t>
             </a:fld>
             <a:endParaRPr lang="it-IT"/>
           </a:p>
@@ -2972,7 +2972,7 @@
           <a:p>
             <a:fld id="{2FDCBEE4-315A-8E42-835E-29A1DAE07625}" type="datetimeFigureOut">
               <a:rPr lang="it-IT" smtClean="0"/>
-              <a:t>03/12/20</a:t>
+              <a:t>04/12/20</a:t>
             </a:fld>
             <a:endParaRPr lang="it-IT"/>
           </a:p>
@@ -3248,7 +3248,7 @@
           <a:p>
             <a:fld id="{2FDCBEE4-315A-8E42-835E-29A1DAE07625}" type="datetimeFigureOut">
               <a:rPr lang="it-IT" smtClean="0"/>
-              <a:t>03/12/20</a:t>
+              <a:t>04/12/20</a:t>
             </a:fld>
             <a:endParaRPr lang="it-IT"/>
           </a:p>
@@ -4702,7 +4702,15 @@
             </a:r>
             <a:r>
               <a:rPr lang="en-US" sz="2000" dirty="0"/>
-              <a:t>: Dynamic catch rate, team composition, user’s team points. Points of a user loses importance after a certain lap of time (negative feedback loop).</a:t>
+              <a:t>: Dynamic catch rate, team composition, user’s team points. Points of a user loses importance after a </a:t>
+            </a:r>
+            <a:r>
+              <a:rPr lang="en-US" sz="2000"/>
+              <a:t>certain period </a:t>
+            </a:r>
+            <a:r>
+              <a:rPr lang="en-US" sz="2000" dirty="0"/>
+              <a:t>of time (negative feedback loop).</a:t>
             </a:r>
             <a:endParaRPr lang="it-IT" sz="2000" dirty="0"/>
           </a:p>
@@ -5268,7 +5276,7 @@
         <p:spPr>
           <a:xfrm>
             <a:off x="291251" y="1517226"/>
-            <a:ext cx="3102187" cy="1477328"/>
+            <a:ext cx="3882164" cy="1477328"/>
           </a:xfrm>
           <a:prstGeom prst="rect">
             <a:avLst/>
@@ -5303,7 +5311,31 @@
             </a:pPr>
             <a:r>
               <a:rPr lang="it-IT" dirty="0"/>
-              <a:t>Team</a:t>
+              <a:t>Pokemon (</a:t>
+            </a:r>
+            <a:r>
+              <a:rPr lang="it-IT" dirty="0" err="1"/>
+              <a:t>name</a:t>
+            </a:r>
+            <a:r>
+              <a:rPr lang="it-IT" dirty="0"/>
+              <a:t>, </a:t>
+            </a:r>
+            <a:r>
+              <a:rPr lang="it-IT" dirty="0" err="1"/>
+              <a:t>sprite</a:t>
+            </a:r>
+            <a:r>
+              <a:rPr lang="it-IT" dirty="0"/>
+              <a:t>, </a:t>
+            </a:r>
+            <a:r>
+              <a:rPr lang="it-IT" dirty="0" err="1"/>
+              <a:t>type</a:t>
+            </a:r>
+            <a:r>
+              <a:rPr lang="it-IT" dirty="0"/>
+              <a:t>)</a:t>
             </a:r>
           </a:p>
           <a:p>
@@ -5902,6 +5934,79 @@
           </a:graphicData>
         </a:graphic>
       </p:graphicFrame>
+      <p:sp>
+        <p:nvSpPr>
+          <p:cNvPr id="5" name="CasellaDiTesto 4">
+            <a:extLst>
+              <a:ext uri="{FF2B5EF4-FFF2-40B4-BE49-F238E27FC236}">
+                <a16:creationId xmlns:a16="http://schemas.microsoft.com/office/drawing/2014/main" id="{5DF4311A-C2DD-C340-9722-337DA3D86E19}"/>
+              </a:ext>
+            </a:extLst>
+          </p:cNvPr>
+          <p:cNvSpPr txBox="1"/>
+          <p:nvPr/>
+        </p:nvSpPr>
+        <p:spPr>
+          <a:xfrm>
+            <a:off x="5310554" y="1606062"/>
+            <a:ext cx="2622064" cy="923330"/>
+          </a:xfrm>
+          <a:prstGeom prst="rect">
+            <a:avLst/>
+          </a:prstGeom>
+          <a:noFill/>
+        </p:spPr>
+        <p:txBody>
+          <a:bodyPr wrap="none" rtlCol="0">
+            <a:spAutoFit/>
+          </a:bodyPr>
+          <a:lstStyle/>
+          <a:p>
+            <a:r>
+              <a:rPr lang="it-IT" dirty="0"/>
+              <a:t>RELATIONSHIP:</a:t>
+            </a:r>
+          </a:p>
+          <a:p>
+            <a:r>
+              <a:rPr lang="it-IT" dirty="0"/>
+              <a:t>	</a:t>
+            </a:r>
+            <a:r>
+              <a:rPr lang="it-IT" dirty="0" err="1"/>
+              <a:t>user</a:t>
+            </a:r>
+            <a:r>
+              <a:rPr lang="it-IT" dirty="0"/>
+              <a:t>-FOLLOW-&gt;</a:t>
+            </a:r>
+            <a:r>
+              <a:rPr lang="it-IT" dirty="0" err="1"/>
+              <a:t>user</a:t>
+            </a:r>
+            <a:endParaRPr lang="it-IT" dirty="0"/>
+          </a:p>
+          <a:p>
+            <a:r>
+              <a:rPr lang="it-IT" dirty="0"/>
+              <a:t>	</a:t>
+            </a:r>
+            <a:r>
+              <a:rPr lang="it-IT" dirty="0" err="1"/>
+              <a:t>user</a:t>
+            </a:r>
+            <a:r>
+              <a:rPr lang="it-IT" dirty="0"/>
+              <a:t>-HAS-&gt; </a:t>
+            </a:r>
+            <a:r>
+              <a:rPr lang="it-IT" dirty="0" err="1"/>
+              <a:t>pokemon</a:t>
+            </a:r>
+            <a:endParaRPr lang="it-IT" dirty="0"/>
+          </a:p>
+        </p:txBody>
+      </p:sp>
     </p:spTree>
     <p:extLst>
       <p:ext uri="{BB962C8B-B14F-4D97-AF65-F5344CB8AC3E}">

</xml_diff>